<commit_message>
Tue Dec  8 17:57:51 CST 2020
</commit_message>
<xml_diff>
--- a/notes11-sat smt.pptx
+++ b/notes11-sat smt.pptx
@@ -3521,10 +3521,10 @@
           <a:bodyPr/>
           <a:p>
             <a:r>
-              <a:rPr lang="" altLang="en-US"/>
+              <a:rPr lang="en-US" altLang="en-US"/>
               <a:t>SMT-LIB</a:t>
             </a:r>
-            <a:endParaRPr lang="" altLang="en-US"/>
+            <a:endParaRPr lang="en-US" altLang="en-US"/>
           </a:p>
         </p:txBody>
       </p:sp>
@@ -3553,18 +3553,18 @@
               <a:buNone/>
             </a:pPr>
             <a:r>
-              <a:rPr lang="" altLang="en-US"/>
+              <a:rPr lang="en-US" altLang="en-US"/>
               <a:t>Reference</a:t>
             </a:r>
-            <a:endParaRPr lang="" altLang="en-US"/>
+            <a:endParaRPr lang="en-US" altLang="en-US"/>
           </a:p>
           <a:p>
             <a:pPr lvl="1"/>
             <a:r>
-              <a:rPr lang="" altLang="en-US"/>
+              <a:rPr lang="en-US" altLang="en-US"/>
               <a:t>smtlib.github.io/jSMTLIB/</a:t>
             </a:r>
-            <a:endParaRPr lang="" altLang="en-US"/>
+            <a:endParaRPr lang="en-US" altLang="en-US"/>
           </a:p>
         </p:txBody>
       </p:sp>
@@ -3590,7 +3590,7 @@
           </a:bodyPr>
           <a:p>
             <a:r>
-              <a:rPr lang="" altLang="en-US"/>
+              <a:rPr lang="en-US" altLang="en-US"/>
               <a:t>1. </a:t>
             </a:r>
             <a:r>
@@ -3598,52 +3598,52 @@
               <a:t>(rule (=&gt; (not (or l4)) (Invariant l4)))</a:t>
             </a:r>
             <a:r>
-              <a:rPr lang="" altLang="en-US"/>
+              <a:rPr lang="en-US" altLang="en-US"/>
               <a:t> 初始条件中变量对应于迁移系统中的状态变量</a:t>
             </a:r>
             <a:r>
-              <a:rPr lang="" altLang="en-US" i="1"/>
+              <a:rPr lang="en-US" altLang="en-US" i="1"/>
               <a:t>(xs)</a:t>
             </a:r>
-            <a:endParaRPr lang="" altLang="en-US" i="1"/>
-          </a:p>
-          <a:p>
-            <a:endParaRPr lang="" altLang="en-US"/>
-          </a:p>
-          <a:p>
-            <a:r>
-              <a:rPr lang="" altLang="en-US"/>
+            <a:endParaRPr lang="en-US" altLang="en-US" i="1"/>
+          </a:p>
+          <a:p>
+            <a:endParaRPr lang="en-US" altLang="en-US"/>
+          </a:p>
+          <a:p>
+            <a:r>
+              <a:rPr lang="en-US" altLang="en-US"/>
               <a:t>2. (rule (=&gt; (and (Invariant l4)</a:t>
             </a:r>
-            <a:endParaRPr lang="" altLang="en-US"/>
-          </a:p>
-          <a:p>
-            <a:r>
-              <a:rPr lang="" altLang="en-US"/>
+            <a:endParaRPr lang="en-US" altLang="en-US"/>
+          </a:p>
+          <a:p>
+            <a:r>
+              <a:rPr lang="en-US" altLang="en-US"/>
               <a:t>  (= (and (not l4) (not l2)) l6)</a:t>
             </a:r>
-            <a:endParaRPr lang="" altLang="en-US"/>
-          </a:p>
-          <a:p>
-            <a:r>
-              <a:rPr lang="" altLang="en-US"/>
+            <a:endParaRPr lang="en-US" altLang="en-US"/>
+          </a:p>
+          <a:p>
+            <a:r>
+              <a:rPr lang="en-US" altLang="en-US"/>
               <a:t>  (= (and l4 l2) l8)</a:t>
             </a:r>
-            <a:endParaRPr lang="" altLang="en-US"/>
-          </a:p>
-          <a:p>
-            <a:r>
-              <a:rPr lang="" altLang="en-US"/>
+            <a:endParaRPr lang="en-US" altLang="en-US"/>
+          </a:p>
+          <a:p>
+            <a:r>
+              <a:rPr lang="en-US" altLang="en-US"/>
               <a:t>  (= (and (not l8) (not l6)) l10)</a:t>
             </a:r>
-            <a:endParaRPr lang="" altLang="en-US"/>
-          </a:p>
-          <a:p>
-            <a:r>
-              <a:rPr lang="" altLang="en-US"/>
+            <a:endParaRPr lang="en-US" altLang="en-US"/>
+          </a:p>
+          <a:p>
+            <a:r>
+              <a:rPr lang="en-US" altLang="en-US"/>
               <a:t>  ) (Invariant l10)))  </a:t>
             </a:r>
-            <a:endParaRPr lang="" altLang="en-US"/>
+            <a:endParaRPr lang="en-US" altLang="en-US"/>
           </a:p>
           <a:p>
             <a:r>
@@ -3653,72 +3653,54 @@
               <a:t>(and (Invariant l4)</a:t>
             </a:r>
             <a:r>
-              <a:rPr lang="" altLang="en-US" sz="1400"/>
+              <a:rPr lang="en-US" altLang="en-US" sz="1400"/>
               <a:t> </a:t>
             </a:r>
             <a:r>
               <a:rPr lang="en-US" altLang="en-US" sz="1400">
                 <a:sym typeface="+mn-ea"/>
               </a:rPr>
-              <a:t>(= (and (not l4) (not l2)) l6)</a:t>
-            </a:r>
-            <a:r>
-              <a:rPr lang="" altLang="en-US" sz="1400">
-                <a:sym typeface="+mn-ea"/>
-              </a:rPr>
-              <a:t> </a:t>
-            </a:r>
+              <a:t>(= (and (not l4) (not l2)) l6)  (= (and l4 l2) l8)  (= (and (not l8) (not l6)) l10) ) =&gt; (Invariant l10)</a:t>
+            </a:r>
+            <a:endParaRPr lang="en-US" altLang="en-US" sz="1400">
+              <a:sym typeface="+mn-ea"/>
+            </a:endParaRPr>
+          </a:p>
+          <a:p>
             <a:r>
               <a:rPr lang="en-US" altLang="en-US" sz="1400">
                 <a:sym typeface="+mn-ea"/>
               </a:rPr>
-              <a:t> (= (and l4 l2) l8)  (= (and (not l8) (not l6)) l10) )</a:t>
-            </a:r>
-            <a:r>
-              <a:rPr lang="" altLang="en-US" sz="1400">
-                <a:sym typeface="+mn-ea"/>
-              </a:rPr>
-              <a:t> =&gt; (Invariant l10)</a:t>
-            </a:r>
-            <a:endParaRPr lang="" altLang="en-US" sz="1400">
+              <a:t>蕴涵式右边的公式中的变量对应于迁移系统中的后继变量(xns)</a:t>
+            </a:r>
+            <a:endParaRPr lang="en-US" altLang="en-US" sz="1400">
               <a:sym typeface="+mn-ea"/>
             </a:endParaRPr>
           </a:p>
           <a:p>
             <a:r>
-              <a:rPr lang="" altLang="en-US" sz="1400">
-                <a:sym typeface="+mn-ea"/>
-              </a:rPr>
-              <a:t>蕴涵式右边的公式中的变量对应于迁移系统中的后继变量(xns)</a:t>
-            </a:r>
-            <a:endParaRPr lang="" altLang="en-US" sz="1400">
-              <a:sym typeface="+mn-ea"/>
-            </a:endParaRPr>
-          </a:p>
-          <a:p>
-            <a:r>
-              <a:rPr lang="" altLang="en-US" sz="1400">
+              <a:rPr lang="en-US" altLang="en-US" sz="1400">
                 <a:sym typeface="+mn-ea"/>
               </a:rPr>
               <a:t>除了状态变量和后继变量外的其余变量对应于迁移系统中的输入变量(inputs)。迁移系统中，迁移规则表达了状态变量和后继变量应满足的条件。</a:t>
             </a:r>
-            <a:endParaRPr lang="" altLang="en-US" sz="1400">
+            <a:endParaRPr lang="en-US" altLang="en-US" sz="1400">
               <a:sym typeface="+mn-ea"/>
             </a:endParaRPr>
           </a:p>
           <a:p>
-            <a:endParaRPr lang="" altLang="en-US" sz="1600">
+            <a:endParaRPr lang="en-US" altLang="en-US" sz="1600">
               <a:sym typeface="+mn-ea"/>
             </a:endParaRPr>
           </a:p>
           <a:p>
             <a:r>
-              <a:rPr lang="" altLang="en-US" sz="1600">
+              <a:rPr lang="en-US" altLang="en-US" sz="1600">
                 <a:sym typeface="+mn-ea"/>
               </a:rPr>
               <a:t>3. (rule (=&gt; (and (Invariant l4) l4) Goal))  对应于迁移系统中：And(l4) （bad state）</a:t>
             </a:r>
-            <a:endParaRPr lang="" altLang="en-US" sz="1600">
+            <a:endParaRPr lang="en-US" altLang="en-US" sz="1600">
               <a:sym typeface="+mn-ea"/>
             </a:endParaRPr>
           </a:p>
@@ -3776,11 +3758,17 @@
         </p:nvSpPr>
         <p:spPr/>
         <p:txBody>
-          <a:bodyPr/>
+          <a:bodyPr>
+            <a:normAutofit lnSpcReduction="10000"/>
+          </a:bodyPr>
           <a:p>
             <a:r>
               <a:rPr lang="en-US" altLang="en-US"/>
               <a:t>ic3 application</a:t>
+            </a:r>
+            <a:r>
+              <a:rPr lang="" altLang="en-US"/>
+              <a:t>/generalize</a:t>
             </a:r>
             <a:endParaRPr lang="en-US" altLang="en-US"/>
           </a:p>

</xml_diff>